<commit_message>
Work on chip overlap
</commit_message>
<xml_diff>
--- a/ch2_groucho.figures/ch2_groucho.figures_unused.pptx
+++ b/ch2_groucho.figures/ch2_groucho.figures_unused.pptx
@@ -7,6 +7,8 @@
   <p:sldIdLst>
     <p:sldId id="256" r:id="rId2"/>
     <p:sldId id="257" r:id="rId3"/>
+    <p:sldId id="258" r:id="rId4"/>
+    <p:sldId id="259" r:id="rId5"/>
   </p:sldIdLst>
   <p:sldSz cx="6858000" cy="9144000" type="letter"/>
   <p:notesSz cx="6858000" cy="9144000"/>
@@ -105,6 +107,11 @@
       </a:defRPr>
     </a:lvl9pPr>
   </p:defaultTextStyle>
+  <p:extLst>
+    <p:ext uri="{EFAFB233-063F-42B5-8137-9DF3F51BA10A}">
+      <p15:sldGuideLst xmlns:p15="http://schemas.microsoft.com/office/powerpoint/2012/main"/>
+    </p:ext>
+  </p:extLst>
 </p:presentation>
 </file>
 
@@ -239,7 +246,7 @@
           <a:p>
             <a:fld id="{8F45B549-1AB7-F54D-8041-FC07701C318C}" type="datetimeFigureOut">
               <a:rPr lang="en-US" smtClean="0"/>
-              <a:t>9/1/15</a:t>
+              <a:t>9/23/15</a:t>
             </a:fld>
             <a:endParaRPr lang="en-US"/>
           </a:p>
@@ -409,7 +416,7 @@
           <a:p>
             <a:fld id="{8F45B549-1AB7-F54D-8041-FC07701C318C}" type="datetimeFigureOut">
               <a:rPr lang="en-US" smtClean="0"/>
-              <a:t>9/1/15</a:t>
+              <a:t>9/23/15</a:t>
             </a:fld>
             <a:endParaRPr lang="en-US"/>
           </a:p>
@@ -589,7 +596,7 @@
           <a:p>
             <a:fld id="{8F45B549-1AB7-F54D-8041-FC07701C318C}" type="datetimeFigureOut">
               <a:rPr lang="en-US" smtClean="0"/>
-              <a:t>9/1/15</a:t>
+              <a:t>9/23/15</a:t>
             </a:fld>
             <a:endParaRPr lang="en-US"/>
           </a:p>
@@ -759,7 +766,7 @@
           <a:p>
             <a:fld id="{8F45B549-1AB7-F54D-8041-FC07701C318C}" type="datetimeFigureOut">
               <a:rPr lang="en-US" smtClean="0"/>
-              <a:t>9/1/15</a:t>
+              <a:t>9/23/15</a:t>
             </a:fld>
             <a:endParaRPr lang="en-US"/>
           </a:p>
@@ -1003,7 +1010,7 @@
           <a:p>
             <a:fld id="{8F45B549-1AB7-F54D-8041-FC07701C318C}" type="datetimeFigureOut">
               <a:rPr lang="en-US" smtClean="0"/>
-              <a:t>9/1/15</a:t>
+              <a:t>9/23/15</a:t>
             </a:fld>
             <a:endParaRPr lang="en-US"/>
           </a:p>
@@ -1235,7 +1242,7 @@
           <a:p>
             <a:fld id="{8F45B549-1AB7-F54D-8041-FC07701C318C}" type="datetimeFigureOut">
               <a:rPr lang="en-US" smtClean="0"/>
-              <a:t>9/1/15</a:t>
+              <a:t>9/23/15</a:t>
             </a:fld>
             <a:endParaRPr lang="en-US"/>
           </a:p>
@@ -1602,7 +1609,7 @@
           <a:p>
             <a:fld id="{8F45B549-1AB7-F54D-8041-FC07701C318C}" type="datetimeFigureOut">
               <a:rPr lang="en-US" smtClean="0"/>
-              <a:t>9/1/15</a:t>
+              <a:t>9/23/15</a:t>
             </a:fld>
             <a:endParaRPr lang="en-US"/>
           </a:p>
@@ -1720,7 +1727,7 @@
           <a:p>
             <a:fld id="{8F45B549-1AB7-F54D-8041-FC07701C318C}" type="datetimeFigureOut">
               <a:rPr lang="en-US" smtClean="0"/>
-              <a:t>9/1/15</a:t>
+              <a:t>9/23/15</a:t>
             </a:fld>
             <a:endParaRPr lang="en-US"/>
           </a:p>
@@ -1815,7 +1822,7 @@
           <a:p>
             <a:fld id="{8F45B549-1AB7-F54D-8041-FC07701C318C}" type="datetimeFigureOut">
               <a:rPr lang="en-US" smtClean="0"/>
-              <a:t>9/1/15</a:t>
+              <a:t>9/23/15</a:t>
             </a:fld>
             <a:endParaRPr lang="en-US"/>
           </a:p>
@@ -2092,7 +2099,7 @@
           <a:p>
             <a:fld id="{8F45B549-1AB7-F54D-8041-FC07701C318C}" type="datetimeFigureOut">
               <a:rPr lang="en-US" smtClean="0"/>
-              <a:t>9/1/15</a:t>
+              <a:t>9/23/15</a:t>
             </a:fld>
             <a:endParaRPr lang="en-US"/>
           </a:p>
@@ -2349,7 +2356,7 @@
           <a:p>
             <a:fld id="{8F45B549-1AB7-F54D-8041-FC07701C318C}" type="datetimeFigureOut">
               <a:rPr lang="en-US" smtClean="0"/>
-              <a:t>9/1/15</a:t>
+              <a:t>9/23/15</a:t>
             </a:fld>
             <a:endParaRPr lang="en-US"/>
           </a:p>
@@ -2562,7 +2569,7 @@
           <a:p>
             <a:fld id="{8F45B549-1AB7-F54D-8041-FC07701C318C}" type="datetimeFigureOut">
               <a:rPr lang="en-US" smtClean="0"/>
-              <a:t>9/1/15</a:t>
+              <a:t>9/23/15</a:t>
             </a:fld>
             <a:endParaRPr lang="en-US"/>
           </a:p>
@@ -3919,6 +3926,320 @@
 </p:sld>
 </file>
 
+<file path=ppt/slides/slide3.xml><?xml version="1.0" encoding="utf-8"?>
+<p:sld xmlns:a="http://schemas.openxmlformats.org/drawingml/2006/main" xmlns:r="http://schemas.openxmlformats.org/officeDocument/2006/relationships" xmlns:p="http://schemas.openxmlformats.org/presentationml/2006/main">
+  <p:cSld>
+    <p:spTree>
+      <p:nvGrpSpPr>
+        <p:cNvPr id="1" name=""/>
+        <p:cNvGrpSpPr/>
+        <p:nvPr/>
+      </p:nvGrpSpPr>
+      <p:grpSpPr>
+        <a:xfrm>
+          <a:off x="0" y="0"/>
+          <a:ext cx="0" cy="0"/>
+          <a:chOff x="0" y="0"/>
+          <a:chExt cx="0" cy="0"/>
+        </a:xfrm>
+      </p:grpSpPr>
+      <p:pic>
+        <p:nvPicPr>
+          <p:cNvPr id="2" name="Picture 1"/>
+          <p:cNvPicPr>
+            <a:picLocks noChangeAspect="1"/>
+          </p:cNvPicPr>
+          <p:nvPr/>
+        </p:nvPicPr>
+        <p:blipFill rotWithShape="1">
+          <a:blip r:embed="rId2">
+            <a:extLst>
+              <a:ext uri="{28A0092B-C50C-407E-A947-70E740481C1C}">
+                <a14:useLocalDpi xmlns:a14="http://schemas.microsoft.com/office/drawing/2010/main" val="0"/>
+              </a:ext>
+            </a:extLst>
+          </a:blip>
+          <a:srcRect t="26603" b="6787"/>
+          <a:stretch/>
+        </p:blipFill>
+        <p:spPr>
+          <a:xfrm>
+            <a:off x="1010092" y="3221665"/>
+            <a:ext cx="5209953" cy="4491060"/>
+          </a:xfrm>
+          <a:prstGeom prst="rect">
+            <a:avLst/>
+          </a:prstGeom>
+        </p:spPr>
+      </p:pic>
+      <p:pic>
+        <p:nvPicPr>
+          <p:cNvPr id="3" name="Picture 2"/>
+          <p:cNvPicPr>
+            <a:picLocks noChangeAspect="1"/>
+          </p:cNvPicPr>
+          <p:nvPr/>
+        </p:nvPicPr>
+        <p:blipFill rotWithShape="1">
+          <a:blip r:embed="rId3">
+            <a:extLst>
+              <a:ext uri="{28A0092B-C50C-407E-A947-70E740481C1C}">
+                <a14:useLocalDpi xmlns:a14="http://schemas.microsoft.com/office/drawing/2010/main" val="0"/>
+              </a:ext>
+            </a:extLst>
+          </a:blip>
+          <a:srcRect l="4961" r="72868" b="75986"/>
+          <a:stretch/>
+        </p:blipFill>
+        <p:spPr>
+          <a:xfrm>
+            <a:off x="1010092" y="2074531"/>
+            <a:ext cx="1520456" cy="774995"/>
+          </a:xfrm>
+          <a:prstGeom prst="rect">
+            <a:avLst/>
+          </a:prstGeom>
+        </p:spPr>
+      </p:pic>
+      <p:sp>
+        <p:nvSpPr>
+          <p:cNvPr id="4" name="TextBox 3"/>
+          <p:cNvSpPr txBox="1"/>
+          <p:nvPr/>
+        </p:nvSpPr>
+        <p:spPr>
+          <a:xfrm>
+            <a:off x="1351102" y="1802810"/>
+            <a:ext cx="838435" cy="369332"/>
+          </a:xfrm>
+          <a:prstGeom prst="rect">
+            <a:avLst/>
+          </a:prstGeom>
+          <a:noFill/>
+        </p:spPr>
+        <p:txBody>
+          <a:bodyPr wrap="none" rtlCol="0">
+            <a:spAutoFit/>
+          </a:bodyPr>
+          <a:lstStyle/>
+          <a:p>
+            <a:r>
+              <a:rPr lang="en-US" i="1" dirty="0"/>
+              <a:t>z</a:t>
+            </a:r>
+            <a:r>
+              <a:rPr lang="en-US" i="1" dirty="0" smtClean="0"/>
+              <a:t>-score</a:t>
+            </a:r>
+            <a:endParaRPr lang="en-US" i="1" dirty="0"/>
+          </a:p>
+        </p:txBody>
+      </p:sp>
+      <p:sp>
+        <p:nvSpPr>
+          <p:cNvPr id="5" name="TextBox 4"/>
+          <p:cNvSpPr txBox="1"/>
+          <p:nvPr/>
+        </p:nvSpPr>
+        <p:spPr>
+          <a:xfrm rot="18900000">
+            <a:off x="2284139" y="7930975"/>
+            <a:ext cx="870751" cy="307777"/>
+          </a:xfrm>
+          <a:prstGeom prst="rect">
+            <a:avLst/>
+          </a:prstGeom>
+          <a:noFill/>
+        </p:spPr>
+        <p:txBody>
+          <a:bodyPr wrap="none" rtlCol="0">
+            <a:spAutoFit/>
+          </a:bodyPr>
+          <a:lstStyle/>
+          <a:p>
+            <a:r>
+              <a:rPr lang="en-US" sz="1400" dirty="0" smtClean="0"/>
+              <a:t>1.5 – 4 </a:t>
+            </a:r>
+            <a:r>
+              <a:rPr lang="en-US" sz="1400" dirty="0" err="1" smtClean="0"/>
+              <a:t>hr</a:t>
+            </a:r>
+            <a:endParaRPr lang="en-US" sz="1400" dirty="0"/>
+          </a:p>
+        </p:txBody>
+      </p:sp>
+      <p:sp>
+        <p:nvSpPr>
+          <p:cNvPr id="6" name="TextBox 5"/>
+          <p:cNvSpPr txBox="1"/>
+          <p:nvPr/>
+        </p:nvSpPr>
+        <p:spPr>
+          <a:xfrm rot="18900000">
+            <a:off x="3350236" y="7949141"/>
+            <a:ext cx="870751" cy="307777"/>
+          </a:xfrm>
+          <a:prstGeom prst="rect">
+            <a:avLst/>
+          </a:prstGeom>
+          <a:noFill/>
+        </p:spPr>
+        <p:txBody>
+          <a:bodyPr wrap="none" rtlCol="0">
+            <a:spAutoFit/>
+          </a:bodyPr>
+          <a:lstStyle/>
+          <a:p>
+            <a:r>
+              <a:rPr lang="en-US" sz="1400" dirty="0" smtClean="0"/>
+              <a:t>4 – 6.5 </a:t>
+            </a:r>
+            <a:r>
+              <a:rPr lang="en-US" sz="1400" dirty="0" err="1" smtClean="0"/>
+              <a:t>hr</a:t>
+            </a:r>
+            <a:endParaRPr lang="en-US" sz="1400" dirty="0"/>
+          </a:p>
+        </p:txBody>
+      </p:sp>
+      <p:sp>
+        <p:nvSpPr>
+          <p:cNvPr id="7" name="TextBox 6"/>
+          <p:cNvSpPr txBox="1"/>
+          <p:nvPr/>
+        </p:nvSpPr>
+        <p:spPr>
+          <a:xfrm rot="18900000">
+            <a:off x="4493881" y="7949140"/>
+            <a:ext cx="835485" cy="307777"/>
+          </a:xfrm>
+          <a:prstGeom prst="rect">
+            <a:avLst/>
+          </a:prstGeom>
+          <a:noFill/>
+        </p:spPr>
+        <p:txBody>
+          <a:bodyPr wrap="none" rtlCol="0">
+            <a:spAutoFit/>
+          </a:bodyPr>
+          <a:lstStyle/>
+          <a:p>
+            <a:r>
+              <a:rPr lang="en-US" sz="1400" smtClean="0"/>
+              <a:t>6.5 - 9 </a:t>
+            </a:r>
+            <a:r>
+              <a:rPr lang="en-US" sz="1400" dirty="0" err="1" smtClean="0"/>
+              <a:t>hr</a:t>
+            </a:r>
+            <a:endParaRPr lang="en-US" sz="1400" dirty="0"/>
+          </a:p>
+        </p:txBody>
+      </p:sp>
+    </p:spTree>
+    <p:extLst>
+      <p:ext uri="{BB962C8B-B14F-4D97-AF65-F5344CB8AC3E}">
+        <p14:creationId xmlns:p14="http://schemas.microsoft.com/office/powerpoint/2010/main" val="42647624"/>
+      </p:ext>
+    </p:extLst>
+  </p:cSld>
+  <p:clrMapOvr>
+    <a:masterClrMapping/>
+  </p:clrMapOvr>
+</p:sld>
+</file>
+
+<file path=ppt/slides/slide4.xml><?xml version="1.0" encoding="utf-8"?>
+<p:sld xmlns:a="http://schemas.openxmlformats.org/drawingml/2006/main" xmlns:r="http://schemas.openxmlformats.org/officeDocument/2006/relationships" xmlns:p="http://schemas.openxmlformats.org/presentationml/2006/main">
+  <p:cSld>
+    <p:spTree>
+      <p:nvGrpSpPr>
+        <p:cNvPr id="1" name=""/>
+        <p:cNvGrpSpPr/>
+        <p:nvPr/>
+      </p:nvGrpSpPr>
+      <p:grpSpPr>
+        <a:xfrm>
+          <a:off x="0" y="0"/>
+          <a:ext cx="0" cy="0"/>
+          <a:chOff x="0" y="0"/>
+          <a:chExt cx="0" cy="0"/>
+        </a:xfrm>
+      </p:grpSpPr>
+      <p:pic>
+        <p:nvPicPr>
+          <p:cNvPr id="2" name="Picture 1"/>
+          <p:cNvPicPr>
+            <a:picLocks noChangeAspect="1"/>
+          </p:cNvPicPr>
+          <p:nvPr/>
+        </p:nvPicPr>
+        <p:blipFill>
+          <a:blip r:embed="rId2">
+            <a:extLst>
+              <a:ext uri="{28A0092B-C50C-407E-A947-70E740481C1C}">
+                <a14:useLocalDpi xmlns:a14="http://schemas.microsoft.com/office/drawing/2010/main" val="0"/>
+              </a:ext>
+            </a:extLst>
+          </a:blip>
+          <a:stretch>
+            <a:fillRect/>
+          </a:stretch>
+        </p:blipFill>
+        <p:spPr>
+          <a:xfrm>
+            <a:off x="595423" y="268941"/>
+            <a:ext cx="6858000" cy="8875059"/>
+          </a:xfrm>
+          <a:prstGeom prst="rect">
+            <a:avLst/>
+          </a:prstGeom>
+        </p:spPr>
+      </p:pic>
+      <p:sp>
+        <p:nvSpPr>
+          <p:cNvPr id="3" name="TextBox 2"/>
+          <p:cNvSpPr txBox="1"/>
+          <p:nvPr/>
+        </p:nvSpPr>
+        <p:spPr>
+          <a:xfrm>
+            <a:off x="0" y="0"/>
+            <a:ext cx="984565" cy="369332"/>
+          </a:xfrm>
+          <a:prstGeom prst="rect">
+            <a:avLst/>
+          </a:prstGeom>
+          <a:noFill/>
+        </p:spPr>
+        <p:txBody>
+          <a:bodyPr wrap="none" rtlCol="0">
+            <a:spAutoFit/>
+          </a:bodyPr>
+          <a:lstStyle/>
+          <a:p>
+            <a:r>
+              <a:rPr lang="en-US" dirty="0" smtClean="0"/>
+              <a:t>Fig. 2-12</a:t>
+            </a:r>
+            <a:endParaRPr lang="en-US" dirty="0"/>
+          </a:p>
+        </p:txBody>
+      </p:sp>
+    </p:spTree>
+    <p:extLst>
+      <p:ext uri="{BB962C8B-B14F-4D97-AF65-F5344CB8AC3E}">
+        <p14:creationId xmlns:p14="http://schemas.microsoft.com/office/powerpoint/2010/main" val="629451228"/>
+      </p:ext>
+    </p:extLst>
+  </p:cSld>
+  <p:clrMapOvr>
+    <a:masterClrMapping/>
+  </p:clrMapOvr>
+</p:sld>
+</file>
+
 <file path=ppt/theme/theme1.xml><?xml version="1.0" encoding="utf-8"?>
 <a:theme xmlns:a="http://schemas.openxmlformats.org/drawingml/2006/main" name="Office Theme">
   <a:themeElements>

</xml_diff>

<commit_message>
Ch 2 network figures integrated into figure file
</commit_message>
<xml_diff>
--- a/ch2_groucho.figures/ch2_groucho.figures_unused.pptx
+++ b/ch2_groucho.figures/ch2_groucho.figures_unused.pptx
@@ -6,10 +6,13 @@
   </p:sldMasterIdLst>
   <p:sldIdLst>
     <p:sldId id="256" r:id="rId2"/>
-    <p:sldId id="257" r:id="rId3"/>
-    <p:sldId id="258" r:id="rId4"/>
-    <p:sldId id="259" r:id="rId5"/>
-    <p:sldId id="260" r:id="rId6"/>
+    <p:sldId id="261" r:id="rId3"/>
+    <p:sldId id="262" r:id="rId4"/>
+    <p:sldId id="263" r:id="rId5"/>
+    <p:sldId id="257" r:id="rId6"/>
+    <p:sldId id="258" r:id="rId7"/>
+    <p:sldId id="259" r:id="rId8"/>
+    <p:sldId id="260" r:id="rId9"/>
   </p:sldIdLst>
   <p:sldSz cx="6858000" cy="9144000" type="letter"/>
   <p:notesSz cx="6858000" cy="9144000"/>
@@ -247,7 +250,7 @@
           <a:p>
             <a:fld id="{8F45B549-1AB7-F54D-8041-FC07701C318C}" type="datetimeFigureOut">
               <a:rPr lang="en-US" smtClean="0"/>
-              <a:t>11/6/15</a:t>
+              <a:t>11/15/15</a:t>
             </a:fld>
             <a:endParaRPr lang="en-US"/>
           </a:p>
@@ -417,7 +420,7 @@
           <a:p>
             <a:fld id="{8F45B549-1AB7-F54D-8041-FC07701C318C}" type="datetimeFigureOut">
               <a:rPr lang="en-US" smtClean="0"/>
-              <a:t>11/6/15</a:t>
+              <a:t>11/15/15</a:t>
             </a:fld>
             <a:endParaRPr lang="en-US"/>
           </a:p>
@@ -597,7 +600,7 @@
           <a:p>
             <a:fld id="{8F45B549-1AB7-F54D-8041-FC07701C318C}" type="datetimeFigureOut">
               <a:rPr lang="en-US" smtClean="0"/>
-              <a:t>11/6/15</a:t>
+              <a:t>11/15/15</a:t>
             </a:fld>
             <a:endParaRPr lang="en-US"/>
           </a:p>
@@ -767,7 +770,7 @@
           <a:p>
             <a:fld id="{8F45B549-1AB7-F54D-8041-FC07701C318C}" type="datetimeFigureOut">
               <a:rPr lang="en-US" smtClean="0"/>
-              <a:t>11/6/15</a:t>
+              <a:t>11/15/15</a:t>
             </a:fld>
             <a:endParaRPr lang="en-US"/>
           </a:p>
@@ -1011,7 +1014,7 @@
           <a:p>
             <a:fld id="{8F45B549-1AB7-F54D-8041-FC07701C318C}" type="datetimeFigureOut">
               <a:rPr lang="en-US" smtClean="0"/>
-              <a:t>11/6/15</a:t>
+              <a:t>11/15/15</a:t>
             </a:fld>
             <a:endParaRPr lang="en-US"/>
           </a:p>
@@ -1243,7 +1246,7 @@
           <a:p>
             <a:fld id="{8F45B549-1AB7-F54D-8041-FC07701C318C}" type="datetimeFigureOut">
               <a:rPr lang="en-US" smtClean="0"/>
-              <a:t>11/6/15</a:t>
+              <a:t>11/15/15</a:t>
             </a:fld>
             <a:endParaRPr lang="en-US"/>
           </a:p>
@@ -1610,7 +1613,7 @@
           <a:p>
             <a:fld id="{8F45B549-1AB7-F54D-8041-FC07701C318C}" type="datetimeFigureOut">
               <a:rPr lang="en-US" smtClean="0"/>
-              <a:t>11/6/15</a:t>
+              <a:t>11/15/15</a:t>
             </a:fld>
             <a:endParaRPr lang="en-US"/>
           </a:p>
@@ -1728,7 +1731,7 @@
           <a:p>
             <a:fld id="{8F45B549-1AB7-F54D-8041-FC07701C318C}" type="datetimeFigureOut">
               <a:rPr lang="en-US" smtClean="0"/>
-              <a:t>11/6/15</a:t>
+              <a:t>11/15/15</a:t>
             </a:fld>
             <a:endParaRPr lang="en-US"/>
           </a:p>
@@ -1823,7 +1826,7 @@
           <a:p>
             <a:fld id="{8F45B549-1AB7-F54D-8041-FC07701C318C}" type="datetimeFigureOut">
               <a:rPr lang="en-US" smtClean="0"/>
-              <a:t>11/6/15</a:t>
+              <a:t>11/15/15</a:t>
             </a:fld>
             <a:endParaRPr lang="en-US"/>
           </a:p>
@@ -2100,7 +2103,7 @@
           <a:p>
             <a:fld id="{8F45B549-1AB7-F54D-8041-FC07701C318C}" type="datetimeFigureOut">
               <a:rPr lang="en-US" smtClean="0"/>
-              <a:t>11/6/15</a:t>
+              <a:t>11/15/15</a:t>
             </a:fld>
             <a:endParaRPr lang="en-US"/>
           </a:p>
@@ -2357,7 +2360,7 @@
           <a:p>
             <a:fld id="{8F45B549-1AB7-F54D-8041-FC07701C318C}" type="datetimeFigureOut">
               <a:rPr lang="en-US" smtClean="0"/>
-              <a:t>11/6/15</a:t>
+              <a:t>11/15/15</a:t>
             </a:fld>
             <a:endParaRPr lang="en-US"/>
           </a:p>
@@ -2570,7 +2573,7 @@
           <a:p>
             <a:fld id="{8F45B549-1AB7-F54D-8041-FC07701C318C}" type="datetimeFigureOut">
               <a:rPr lang="en-US" smtClean="0"/>
-              <a:t>11/6/15</a:t>
+              <a:t>11/15/15</a:t>
             </a:fld>
             <a:endParaRPr lang="en-US"/>
           </a:p>
@@ -3630,39 +3633,9 @@
           <a:chExt cx="0" cy="0"/>
         </a:xfrm>
       </p:grpSpPr>
-      <p:sp>
-        <p:nvSpPr>
-          <p:cNvPr id="7" name="TextBox 6"/>
-          <p:cNvSpPr txBox="1"/>
-          <p:nvPr/>
-        </p:nvSpPr>
-        <p:spPr>
-          <a:xfrm>
-            <a:off x="0" y="0"/>
-            <a:ext cx="867545" cy="369332"/>
-          </a:xfrm>
-          <a:prstGeom prst="rect">
-            <a:avLst/>
-          </a:prstGeom>
-          <a:noFill/>
-        </p:spPr>
-        <p:txBody>
-          <a:bodyPr wrap="none" rtlCol="0">
-            <a:spAutoFit/>
-          </a:bodyPr>
-          <a:lstStyle/>
-          <a:p>
-            <a:r>
-              <a:rPr lang="en-US" dirty="0" smtClean="0"/>
-              <a:t>Fig. 2-4</a:t>
-            </a:r>
-            <a:endParaRPr lang="en-US" dirty="0"/>
-          </a:p>
-        </p:txBody>
-      </p:sp>
       <p:pic>
         <p:nvPicPr>
-          <p:cNvPr id="8" name="Picture 7"/>
+          <p:cNvPr id="2" name="Picture 1"/>
           <p:cNvPicPr>
             <a:picLocks noChangeAspect="1"/>
           </p:cNvPicPr>
@@ -3682,8 +3655,8 @@
         </p:blipFill>
         <p:spPr>
           <a:xfrm>
-            <a:off x="670384" y="2381963"/>
-            <a:ext cx="2428217" cy="2428217"/>
+            <a:off x="825285" y="1743559"/>
+            <a:ext cx="5284922" cy="5284922"/>
           </a:xfrm>
           <a:prstGeom prst="rect">
             <a:avLst/>
@@ -3692,44 +3665,60 @@
       </p:pic>
       <p:sp>
         <p:nvSpPr>
-          <p:cNvPr id="3" name="TextBox 2"/>
-          <p:cNvSpPr txBox="1"/>
+          <p:cNvPr id="5" name="Rectangle 4"/>
+          <p:cNvSpPr/>
           <p:nvPr/>
         </p:nvSpPr>
         <p:spPr>
           <a:xfrm>
-            <a:off x="1452282" y="2064123"/>
-            <a:ext cx="684803" cy="369332"/>
+            <a:off x="4193177" y="4049485"/>
+            <a:ext cx="435429" cy="422365"/>
           </a:xfrm>
           <a:prstGeom prst="rect">
             <a:avLst/>
           </a:prstGeom>
           <a:noFill/>
-        </p:spPr>
-        <p:txBody>
-          <a:bodyPr wrap="none" rtlCol="0">
-            <a:spAutoFit/>
-          </a:bodyPr>
-          <a:lstStyle/>
-          <a:p>
-            <a:r>
-              <a:rPr lang="en-US" smtClean="0"/>
-              <a:t>Input</a:t>
-            </a:r>
+          <a:ln>
+            <a:solidFill>
+              <a:srgbClr val="FF0000"/>
+            </a:solidFill>
+          </a:ln>
+        </p:spPr>
+        <p:style>
+          <a:lnRef idx="2">
+            <a:schemeClr val="accent1">
+              <a:shade val="50000"/>
+            </a:schemeClr>
+          </a:lnRef>
+          <a:fillRef idx="1">
+            <a:schemeClr val="accent1"/>
+          </a:fillRef>
+          <a:effectRef idx="0">
+            <a:schemeClr val="accent1"/>
+          </a:effectRef>
+          <a:fontRef idx="minor">
+            <a:schemeClr val="lt1"/>
+          </a:fontRef>
+        </p:style>
+        <p:txBody>
+          <a:bodyPr rtlCol="0" anchor="ctr"/>
+          <a:lstStyle/>
+          <a:p>
+            <a:pPr algn="ctr"/>
             <a:endParaRPr lang="en-US"/>
           </a:p>
         </p:txBody>
       </p:sp>
       <p:sp>
         <p:nvSpPr>
-          <p:cNvPr id="4" name="TextBox 3"/>
+          <p:cNvPr id="3" name="TextBox 2"/>
           <p:cNvSpPr txBox="1"/>
           <p:nvPr/>
         </p:nvSpPr>
         <p:spPr>
           <a:xfrm>
-            <a:off x="4583194" y="2061879"/>
-            <a:ext cx="1069524" cy="369332"/>
+            <a:off x="1234440" y="7094220"/>
+            <a:ext cx="518925" cy="369332"/>
           </a:xfrm>
           <a:prstGeom prst="rect">
             <a:avLst/>
@@ -3744,171 +3733,7 @@
           <a:p>
             <a:r>
               <a:rPr lang="en-US" dirty="0" smtClean="0"/>
-              <a:t>1.5 – 4 </a:t>
-            </a:r>
-            <a:r>
-              <a:rPr lang="en-US" dirty="0" err="1" smtClean="0"/>
-              <a:t>hr</a:t>
-            </a:r>
-            <a:endParaRPr lang="en-US" dirty="0"/>
-          </a:p>
-        </p:txBody>
-      </p:sp>
-      <p:sp>
-        <p:nvSpPr>
-          <p:cNvPr id="5" name="TextBox 4"/>
-          <p:cNvSpPr txBox="1"/>
-          <p:nvPr/>
-        </p:nvSpPr>
-        <p:spPr>
-          <a:xfrm>
-            <a:off x="1259921" y="4943354"/>
-            <a:ext cx="1069524" cy="369332"/>
-          </a:xfrm>
-          <a:prstGeom prst="rect">
-            <a:avLst/>
-          </a:prstGeom>
-          <a:noFill/>
-        </p:spPr>
-        <p:txBody>
-          <a:bodyPr wrap="none" rtlCol="0">
-            <a:spAutoFit/>
-          </a:bodyPr>
-          <a:lstStyle/>
-          <a:p>
-            <a:pPr algn="ctr"/>
-            <a:r>
-              <a:rPr lang="en-US" dirty="0" smtClean="0"/>
-              <a:t>4 – 6.5 </a:t>
-            </a:r>
-            <a:r>
-              <a:rPr lang="en-US" dirty="0" err="1" smtClean="0"/>
-              <a:t>hr</a:t>
-            </a:r>
-            <a:endParaRPr lang="en-US" dirty="0"/>
-          </a:p>
-        </p:txBody>
-      </p:sp>
-      <p:pic>
-        <p:nvPicPr>
-          <p:cNvPr id="9" name="Picture 8"/>
-          <p:cNvPicPr>
-            <a:picLocks noChangeAspect="1"/>
-          </p:cNvPicPr>
-          <p:nvPr/>
-        </p:nvPicPr>
-        <p:blipFill>
-          <a:blip r:embed="rId3">
-            <a:extLst>
-              <a:ext uri="{28A0092B-C50C-407E-A947-70E740481C1C}">
-                <a14:useLocalDpi xmlns:a14="http://schemas.microsoft.com/office/drawing/2010/main" val="0"/>
-              </a:ext>
-            </a:extLst>
-          </a:blip>
-          <a:stretch>
-            <a:fillRect/>
-          </a:stretch>
-        </p:blipFill>
-        <p:spPr>
-          <a:xfrm>
-            <a:off x="3806684" y="2431211"/>
-            <a:ext cx="2378969" cy="2378969"/>
-          </a:xfrm>
-          <a:prstGeom prst="rect">
-            <a:avLst/>
-          </a:prstGeom>
-        </p:spPr>
-      </p:pic>
-      <p:pic>
-        <p:nvPicPr>
-          <p:cNvPr id="10" name="Picture 9"/>
-          <p:cNvPicPr>
-            <a:picLocks noChangeAspect="1"/>
-          </p:cNvPicPr>
-          <p:nvPr/>
-        </p:nvPicPr>
-        <p:blipFill>
-          <a:blip r:embed="rId4">
-            <a:extLst>
-              <a:ext uri="{28A0092B-C50C-407E-A947-70E740481C1C}">
-                <a14:useLocalDpi xmlns:a14="http://schemas.microsoft.com/office/drawing/2010/main" val="0"/>
-              </a:ext>
-            </a:extLst>
-          </a:blip>
-          <a:stretch>
-            <a:fillRect/>
-          </a:stretch>
-        </p:blipFill>
-        <p:spPr>
-          <a:xfrm>
-            <a:off x="590872" y="5486400"/>
-            <a:ext cx="2424867" cy="2424867"/>
-          </a:xfrm>
-          <a:prstGeom prst="rect">
-            <a:avLst/>
-          </a:prstGeom>
-        </p:spPr>
-      </p:pic>
-      <p:pic>
-        <p:nvPicPr>
-          <p:cNvPr id="11" name="Picture 10"/>
-          <p:cNvPicPr>
-            <a:picLocks noChangeAspect="1"/>
-          </p:cNvPicPr>
-          <p:nvPr/>
-        </p:nvPicPr>
-        <p:blipFill>
-          <a:blip r:embed="rId5">
-            <a:extLst>
-              <a:ext uri="{28A0092B-C50C-407E-A947-70E740481C1C}">
-                <a14:useLocalDpi xmlns:a14="http://schemas.microsoft.com/office/drawing/2010/main" val="0"/>
-              </a:ext>
-            </a:extLst>
-          </a:blip>
-          <a:stretch>
-            <a:fillRect/>
-          </a:stretch>
-        </p:blipFill>
-        <p:spPr>
-          <a:xfrm>
-            <a:off x="3803868" y="5519825"/>
-            <a:ext cx="2381785" cy="2381785"/>
-          </a:xfrm>
-          <a:prstGeom prst="rect">
-            <a:avLst/>
-          </a:prstGeom>
-        </p:spPr>
-      </p:pic>
-      <p:sp>
-        <p:nvSpPr>
-          <p:cNvPr id="6" name="TextBox 5"/>
-          <p:cNvSpPr txBox="1"/>
-          <p:nvPr/>
-        </p:nvSpPr>
-        <p:spPr>
-          <a:xfrm>
-            <a:off x="4506112" y="4963624"/>
-            <a:ext cx="1069524" cy="369332"/>
-          </a:xfrm>
-          <a:prstGeom prst="rect">
-            <a:avLst/>
-          </a:prstGeom>
-          <a:noFill/>
-        </p:spPr>
-        <p:txBody>
-          <a:bodyPr wrap="none" rtlCol="0">
-            <a:spAutoFit/>
-          </a:bodyPr>
-          <a:lstStyle/>
-          <a:p>
-            <a:pPr algn="ctr"/>
-            <a:r>
-              <a:rPr lang="en-US" dirty="0" smtClean="0"/>
-              <a:t>6.5 – 9 </a:t>
-            </a:r>
-            <a:r>
-              <a:rPr lang="en-US" dirty="0" err="1" smtClean="0"/>
-              <a:t>hr</a:t>
+              <a:t>Key</a:t>
             </a:r>
             <a:endParaRPr lang="en-US" dirty="0"/>
           </a:p>
@@ -3917,7 +3742,7 @@
     </p:spTree>
     <p:extLst>
       <p:ext uri="{BB962C8B-B14F-4D97-AF65-F5344CB8AC3E}">
-        <p14:creationId xmlns:p14="http://schemas.microsoft.com/office/powerpoint/2010/main" val="1147650654"/>
+        <p14:creationId xmlns:p14="http://schemas.microsoft.com/office/powerpoint/2010/main" val="991524273"/>
       </p:ext>
     </p:extLst>
   </p:cSld>
@@ -3946,13 +3771,13 @@
       </p:grpSpPr>
       <p:pic>
         <p:nvPicPr>
-          <p:cNvPr id="2" name="Picture 1"/>
+          <p:cNvPr id="3" name="Picture 2"/>
           <p:cNvPicPr>
             <a:picLocks noChangeAspect="1"/>
           </p:cNvPicPr>
           <p:nvPr/>
         </p:nvPicPr>
-        <p:blipFill rotWithShape="1">
+        <p:blipFill>
           <a:blip r:embed="rId2">
             <a:extLst>
               <a:ext uri="{28A0092B-C50C-407E-A947-70E740481C1C}">
@@ -3960,13 +3785,14 @@
               </a:ext>
             </a:extLst>
           </a:blip>
-          <a:srcRect t="26603" b="6787"/>
-          <a:stretch/>
+          <a:stretch>
+            <a:fillRect/>
+          </a:stretch>
         </p:blipFill>
         <p:spPr>
           <a:xfrm>
-            <a:off x="1010092" y="3221665"/>
-            <a:ext cx="5209953" cy="4491060"/>
+            <a:off x="743298" y="1116419"/>
+            <a:ext cx="5990182" cy="3327879"/>
           </a:xfrm>
           <a:prstGeom prst="rect">
             <a:avLst/>
@@ -3975,13 +3801,13 @@
       </p:pic>
       <p:pic>
         <p:nvPicPr>
-          <p:cNvPr id="3" name="Picture 2"/>
+          <p:cNvPr id="4" name="Picture 3"/>
           <p:cNvPicPr>
             <a:picLocks noChangeAspect="1"/>
           </p:cNvPicPr>
           <p:nvPr/>
         </p:nvPicPr>
-        <p:blipFill rotWithShape="1">
+        <p:blipFill>
           <a:blip r:embed="rId3">
             <a:extLst>
               <a:ext uri="{28A0092B-C50C-407E-A947-70E740481C1C}">
@@ -3989,13 +3815,14 @@
               </a:ext>
             </a:extLst>
           </a:blip>
-          <a:srcRect l="4961" r="72868" b="75986"/>
-          <a:stretch/>
+          <a:stretch>
+            <a:fillRect/>
+          </a:stretch>
         </p:blipFill>
         <p:spPr>
           <a:xfrm>
-            <a:off x="1010092" y="2074531"/>
-            <a:ext cx="1520456" cy="774995"/>
+            <a:off x="107370" y="4735328"/>
+            <a:ext cx="6858000" cy="5299364"/>
           </a:xfrm>
           <a:prstGeom prst="rect">
             <a:avLst/>
@@ -4004,14 +3831,60 @@
       </p:pic>
       <p:sp>
         <p:nvSpPr>
-          <p:cNvPr id="4" name="TextBox 3"/>
+          <p:cNvPr id="6" name="Rectangle 5"/>
+          <p:cNvSpPr/>
+          <p:nvPr/>
+        </p:nvSpPr>
+        <p:spPr>
+          <a:xfrm>
+            <a:off x="1382233" y="5191385"/>
+            <a:ext cx="5351247" cy="142189"/>
+          </a:xfrm>
+          <a:prstGeom prst="rect">
+            <a:avLst/>
+          </a:prstGeom>
+          <a:solidFill>
+            <a:schemeClr val="bg1"/>
+          </a:solidFill>
+          <a:ln>
+            <a:noFill/>
+          </a:ln>
+        </p:spPr>
+        <p:style>
+          <a:lnRef idx="2">
+            <a:schemeClr val="accent1">
+              <a:shade val="50000"/>
+            </a:schemeClr>
+          </a:lnRef>
+          <a:fillRef idx="1">
+            <a:schemeClr val="accent1"/>
+          </a:fillRef>
+          <a:effectRef idx="0">
+            <a:schemeClr val="accent1"/>
+          </a:effectRef>
+          <a:fontRef idx="minor">
+            <a:schemeClr val="lt1"/>
+          </a:fontRef>
+        </p:style>
+        <p:txBody>
+          <a:bodyPr rtlCol="0" anchor="ctr"/>
+          <a:lstStyle/>
+          <a:p>
+            <a:pPr algn="ctr"/>
+            <a:endParaRPr lang="en-US"/>
+          </a:p>
+        </p:txBody>
+      </p:sp>
+      <p:sp>
+        <p:nvSpPr>
+          <p:cNvPr id="5" name="TextBox 4"/>
           <p:cNvSpPr txBox="1"/>
           <p:nvPr/>
         </p:nvSpPr>
         <p:spPr>
           <a:xfrm>
-            <a:off x="1351102" y="1802810"/>
-            <a:ext cx="838435" cy="369332"/>
+            <a:off x="2383519" y="5123979"/>
+            <a:ext cx="3348674" cy="276999"/>
           </a:xfrm>
           <a:prstGeom prst="rect">
             <a:avLst/>
@@ -4025,123 +3898,17 @@
           <a:lstStyle/>
           <a:p>
             <a:r>
-              <a:rPr lang="en-US" i="1" dirty="0"/>
-              <a:t>z</a:t>
-            </a:r>
-            <a:r>
-              <a:rPr lang="en-US" i="1" dirty="0" smtClean="0"/>
-              <a:t>-score</a:t>
-            </a:r>
-            <a:endParaRPr lang="en-US" i="1" dirty="0"/>
-          </a:p>
-        </p:txBody>
-      </p:sp>
-      <p:sp>
-        <p:nvSpPr>
-          <p:cNvPr id="5" name="TextBox 4"/>
-          <p:cNvSpPr txBox="1"/>
-          <p:nvPr/>
-        </p:nvSpPr>
-        <p:spPr>
-          <a:xfrm rot="18900000">
-            <a:off x="2284139" y="7930975"/>
-            <a:ext cx="870751" cy="307777"/>
-          </a:xfrm>
-          <a:prstGeom prst="rect">
-            <a:avLst/>
-          </a:prstGeom>
-          <a:noFill/>
-        </p:spPr>
-        <p:txBody>
-          <a:bodyPr wrap="none" rtlCol="0">
-            <a:spAutoFit/>
-          </a:bodyPr>
-          <a:lstStyle/>
-          <a:p>
-            <a:r>
-              <a:rPr lang="en-US" sz="1400" dirty="0" smtClean="0"/>
-              <a:t>1.5 – 4 </a:t>
-            </a:r>
-            <a:r>
-              <a:rPr lang="en-US" sz="1400" dirty="0" err="1" smtClean="0"/>
-              <a:t>hr</a:t>
-            </a:r>
-            <a:endParaRPr lang="en-US" sz="1400" dirty="0"/>
-          </a:p>
-        </p:txBody>
-      </p:sp>
-      <p:sp>
-        <p:nvSpPr>
-          <p:cNvPr id="6" name="TextBox 5"/>
-          <p:cNvSpPr txBox="1"/>
-          <p:nvPr/>
-        </p:nvSpPr>
-        <p:spPr>
-          <a:xfrm rot="18900000">
-            <a:off x="3350236" y="7949141"/>
-            <a:ext cx="870751" cy="307777"/>
-          </a:xfrm>
-          <a:prstGeom prst="rect">
-            <a:avLst/>
-          </a:prstGeom>
-          <a:noFill/>
-        </p:spPr>
-        <p:txBody>
-          <a:bodyPr wrap="none" rtlCol="0">
-            <a:spAutoFit/>
-          </a:bodyPr>
-          <a:lstStyle/>
-          <a:p>
-            <a:r>
-              <a:rPr lang="en-US" sz="1400" dirty="0" smtClean="0"/>
-              <a:t>4 – 6.5 </a:t>
-            </a:r>
-            <a:r>
-              <a:rPr lang="en-US" sz="1400" dirty="0" err="1" smtClean="0"/>
-              <a:t>hr</a:t>
-            </a:r>
-            <a:endParaRPr lang="en-US" sz="1400" dirty="0"/>
-          </a:p>
-        </p:txBody>
-      </p:sp>
-      <p:sp>
-        <p:nvSpPr>
-          <p:cNvPr id="7" name="TextBox 6"/>
-          <p:cNvSpPr txBox="1"/>
-          <p:nvPr/>
-        </p:nvSpPr>
-        <p:spPr>
-          <a:xfrm rot="18900000">
-            <a:off x="4493881" y="7949140"/>
-            <a:ext cx="835485" cy="307777"/>
-          </a:xfrm>
-          <a:prstGeom prst="rect">
-            <a:avLst/>
-          </a:prstGeom>
-          <a:noFill/>
-        </p:spPr>
-        <p:txBody>
-          <a:bodyPr wrap="none" rtlCol="0">
-            <a:spAutoFit/>
-          </a:bodyPr>
-          <a:lstStyle/>
-          <a:p>
-            <a:r>
-              <a:rPr lang="en-US" sz="1400" smtClean="0"/>
-              <a:t>6.5 - 9 </a:t>
-            </a:r>
-            <a:r>
-              <a:rPr lang="en-US" sz="1400" dirty="0" err="1" smtClean="0"/>
-              <a:t>hr</a:t>
-            </a:r>
-            <a:endParaRPr lang="en-US" sz="1400" dirty="0"/>
+              <a:rPr lang="en-US" sz="1200" dirty="0" smtClean="0"/>
+              <a:t>Percentage of genes with internal Groucho binding</a:t>
+            </a:r>
+            <a:endParaRPr lang="en-US" sz="1200" dirty="0"/>
           </a:p>
         </p:txBody>
       </p:sp>
     </p:spTree>
     <p:extLst>
       <p:ext uri="{BB962C8B-B14F-4D97-AF65-F5344CB8AC3E}">
-        <p14:creationId xmlns:p14="http://schemas.microsoft.com/office/powerpoint/2010/main" val="42647624"/>
+        <p14:creationId xmlns:p14="http://schemas.microsoft.com/office/powerpoint/2010/main" val="1617741281"/>
       </p:ext>
     </p:extLst>
   </p:cSld>
@@ -4190,6 +3957,604 @@
         </p:blipFill>
         <p:spPr>
           <a:xfrm>
+            <a:off x="673767" y="1283697"/>
+            <a:ext cx="6005477" cy="3473899"/>
+          </a:xfrm>
+          <a:prstGeom prst="rect">
+            <a:avLst/>
+          </a:prstGeom>
+        </p:spPr>
+      </p:pic>
+    </p:spTree>
+    <p:extLst>
+      <p:ext uri="{BB962C8B-B14F-4D97-AF65-F5344CB8AC3E}">
+        <p14:creationId xmlns:p14="http://schemas.microsoft.com/office/powerpoint/2010/main" val="87255100"/>
+      </p:ext>
+    </p:extLst>
+  </p:cSld>
+  <p:clrMapOvr>
+    <a:masterClrMapping/>
+  </p:clrMapOvr>
+</p:sld>
+</file>
+
+<file path=ppt/slides/slide5.xml><?xml version="1.0" encoding="utf-8"?>
+<p:sld xmlns:a="http://schemas.openxmlformats.org/drawingml/2006/main" xmlns:r="http://schemas.openxmlformats.org/officeDocument/2006/relationships" xmlns:p="http://schemas.openxmlformats.org/presentationml/2006/main">
+  <p:cSld>
+    <p:spTree>
+      <p:nvGrpSpPr>
+        <p:cNvPr id="1" name=""/>
+        <p:cNvGrpSpPr/>
+        <p:nvPr/>
+      </p:nvGrpSpPr>
+      <p:grpSpPr>
+        <a:xfrm>
+          <a:off x="0" y="0"/>
+          <a:ext cx="0" cy="0"/>
+          <a:chOff x="0" y="0"/>
+          <a:chExt cx="0" cy="0"/>
+        </a:xfrm>
+      </p:grpSpPr>
+      <p:sp>
+        <p:nvSpPr>
+          <p:cNvPr id="7" name="TextBox 6"/>
+          <p:cNvSpPr txBox="1"/>
+          <p:nvPr/>
+        </p:nvSpPr>
+        <p:spPr>
+          <a:xfrm>
+            <a:off x="0" y="0"/>
+            <a:ext cx="867545" cy="369332"/>
+          </a:xfrm>
+          <a:prstGeom prst="rect">
+            <a:avLst/>
+          </a:prstGeom>
+          <a:noFill/>
+        </p:spPr>
+        <p:txBody>
+          <a:bodyPr wrap="none" rtlCol="0">
+            <a:spAutoFit/>
+          </a:bodyPr>
+          <a:lstStyle/>
+          <a:p>
+            <a:r>
+              <a:rPr lang="en-US" dirty="0" smtClean="0"/>
+              <a:t>Fig. 2-4</a:t>
+            </a:r>
+            <a:endParaRPr lang="en-US" dirty="0"/>
+          </a:p>
+        </p:txBody>
+      </p:sp>
+      <p:pic>
+        <p:nvPicPr>
+          <p:cNvPr id="8" name="Picture 7"/>
+          <p:cNvPicPr>
+            <a:picLocks noChangeAspect="1"/>
+          </p:cNvPicPr>
+          <p:nvPr/>
+        </p:nvPicPr>
+        <p:blipFill>
+          <a:blip r:embed="rId2">
+            <a:extLst>
+              <a:ext uri="{28A0092B-C50C-407E-A947-70E740481C1C}">
+                <a14:useLocalDpi xmlns:a14="http://schemas.microsoft.com/office/drawing/2010/main" val="0"/>
+              </a:ext>
+            </a:extLst>
+          </a:blip>
+          <a:stretch>
+            <a:fillRect/>
+          </a:stretch>
+        </p:blipFill>
+        <p:spPr>
+          <a:xfrm>
+            <a:off x="670384" y="2381963"/>
+            <a:ext cx="2428217" cy="2428217"/>
+          </a:xfrm>
+          <a:prstGeom prst="rect">
+            <a:avLst/>
+          </a:prstGeom>
+        </p:spPr>
+      </p:pic>
+      <p:sp>
+        <p:nvSpPr>
+          <p:cNvPr id="3" name="TextBox 2"/>
+          <p:cNvSpPr txBox="1"/>
+          <p:nvPr/>
+        </p:nvSpPr>
+        <p:spPr>
+          <a:xfrm>
+            <a:off x="1452282" y="2064123"/>
+            <a:ext cx="684803" cy="369332"/>
+          </a:xfrm>
+          <a:prstGeom prst="rect">
+            <a:avLst/>
+          </a:prstGeom>
+          <a:noFill/>
+        </p:spPr>
+        <p:txBody>
+          <a:bodyPr wrap="none" rtlCol="0">
+            <a:spAutoFit/>
+          </a:bodyPr>
+          <a:lstStyle/>
+          <a:p>
+            <a:r>
+              <a:rPr lang="en-US" smtClean="0"/>
+              <a:t>Input</a:t>
+            </a:r>
+            <a:endParaRPr lang="en-US"/>
+          </a:p>
+        </p:txBody>
+      </p:sp>
+      <p:sp>
+        <p:nvSpPr>
+          <p:cNvPr id="4" name="TextBox 3"/>
+          <p:cNvSpPr txBox="1"/>
+          <p:nvPr/>
+        </p:nvSpPr>
+        <p:spPr>
+          <a:xfrm>
+            <a:off x="4583194" y="2061879"/>
+            <a:ext cx="1069524" cy="369332"/>
+          </a:xfrm>
+          <a:prstGeom prst="rect">
+            <a:avLst/>
+          </a:prstGeom>
+          <a:noFill/>
+        </p:spPr>
+        <p:txBody>
+          <a:bodyPr wrap="none" rtlCol="0">
+            <a:spAutoFit/>
+          </a:bodyPr>
+          <a:lstStyle/>
+          <a:p>
+            <a:r>
+              <a:rPr lang="en-US" dirty="0" smtClean="0"/>
+              <a:t>1.5 – 4 </a:t>
+            </a:r>
+            <a:r>
+              <a:rPr lang="en-US" dirty="0" err="1" smtClean="0"/>
+              <a:t>hr</a:t>
+            </a:r>
+            <a:endParaRPr lang="en-US" dirty="0"/>
+          </a:p>
+        </p:txBody>
+      </p:sp>
+      <p:sp>
+        <p:nvSpPr>
+          <p:cNvPr id="5" name="TextBox 4"/>
+          <p:cNvSpPr txBox="1"/>
+          <p:nvPr/>
+        </p:nvSpPr>
+        <p:spPr>
+          <a:xfrm>
+            <a:off x="1259921" y="4943354"/>
+            <a:ext cx="1069524" cy="369332"/>
+          </a:xfrm>
+          <a:prstGeom prst="rect">
+            <a:avLst/>
+          </a:prstGeom>
+          <a:noFill/>
+        </p:spPr>
+        <p:txBody>
+          <a:bodyPr wrap="none" rtlCol="0">
+            <a:spAutoFit/>
+          </a:bodyPr>
+          <a:lstStyle/>
+          <a:p>
+            <a:pPr algn="ctr"/>
+            <a:r>
+              <a:rPr lang="en-US" dirty="0" smtClean="0"/>
+              <a:t>4 – 6.5 </a:t>
+            </a:r>
+            <a:r>
+              <a:rPr lang="en-US" dirty="0" err="1" smtClean="0"/>
+              <a:t>hr</a:t>
+            </a:r>
+            <a:endParaRPr lang="en-US" dirty="0"/>
+          </a:p>
+        </p:txBody>
+      </p:sp>
+      <p:pic>
+        <p:nvPicPr>
+          <p:cNvPr id="9" name="Picture 8"/>
+          <p:cNvPicPr>
+            <a:picLocks noChangeAspect="1"/>
+          </p:cNvPicPr>
+          <p:nvPr/>
+        </p:nvPicPr>
+        <p:blipFill>
+          <a:blip r:embed="rId3">
+            <a:extLst>
+              <a:ext uri="{28A0092B-C50C-407E-A947-70E740481C1C}">
+                <a14:useLocalDpi xmlns:a14="http://schemas.microsoft.com/office/drawing/2010/main" val="0"/>
+              </a:ext>
+            </a:extLst>
+          </a:blip>
+          <a:stretch>
+            <a:fillRect/>
+          </a:stretch>
+        </p:blipFill>
+        <p:spPr>
+          <a:xfrm>
+            <a:off x="3806684" y="2431211"/>
+            <a:ext cx="2378969" cy="2378969"/>
+          </a:xfrm>
+          <a:prstGeom prst="rect">
+            <a:avLst/>
+          </a:prstGeom>
+        </p:spPr>
+      </p:pic>
+      <p:pic>
+        <p:nvPicPr>
+          <p:cNvPr id="10" name="Picture 9"/>
+          <p:cNvPicPr>
+            <a:picLocks noChangeAspect="1"/>
+          </p:cNvPicPr>
+          <p:nvPr/>
+        </p:nvPicPr>
+        <p:blipFill>
+          <a:blip r:embed="rId4">
+            <a:extLst>
+              <a:ext uri="{28A0092B-C50C-407E-A947-70E740481C1C}">
+                <a14:useLocalDpi xmlns:a14="http://schemas.microsoft.com/office/drawing/2010/main" val="0"/>
+              </a:ext>
+            </a:extLst>
+          </a:blip>
+          <a:stretch>
+            <a:fillRect/>
+          </a:stretch>
+        </p:blipFill>
+        <p:spPr>
+          <a:xfrm>
+            <a:off x="590872" y="5486400"/>
+            <a:ext cx="2424867" cy="2424867"/>
+          </a:xfrm>
+          <a:prstGeom prst="rect">
+            <a:avLst/>
+          </a:prstGeom>
+        </p:spPr>
+      </p:pic>
+      <p:pic>
+        <p:nvPicPr>
+          <p:cNvPr id="11" name="Picture 10"/>
+          <p:cNvPicPr>
+            <a:picLocks noChangeAspect="1"/>
+          </p:cNvPicPr>
+          <p:nvPr/>
+        </p:nvPicPr>
+        <p:blipFill>
+          <a:blip r:embed="rId5">
+            <a:extLst>
+              <a:ext uri="{28A0092B-C50C-407E-A947-70E740481C1C}">
+                <a14:useLocalDpi xmlns:a14="http://schemas.microsoft.com/office/drawing/2010/main" val="0"/>
+              </a:ext>
+            </a:extLst>
+          </a:blip>
+          <a:stretch>
+            <a:fillRect/>
+          </a:stretch>
+        </p:blipFill>
+        <p:spPr>
+          <a:xfrm>
+            <a:off x="3803868" y="5519825"/>
+            <a:ext cx="2381785" cy="2381785"/>
+          </a:xfrm>
+          <a:prstGeom prst="rect">
+            <a:avLst/>
+          </a:prstGeom>
+        </p:spPr>
+      </p:pic>
+      <p:sp>
+        <p:nvSpPr>
+          <p:cNvPr id="6" name="TextBox 5"/>
+          <p:cNvSpPr txBox="1"/>
+          <p:nvPr/>
+        </p:nvSpPr>
+        <p:spPr>
+          <a:xfrm>
+            <a:off x="4506112" y="4963624"/>
+            <a:ext cx="1069524" cy="369332"/>
+          </a:xfrm>
+          <a:prstGeom prst="rect">
+            <a:avLst/>
+          </a:prstGeom>
+          <a:noFill/>
+        </p:spPr>
+        <p:txBody>
+          <a:bodyPr wrap="none" rtlCol="0">
+            <a:spAutoFit/>
+          </a:bodyPr>
+          <a:lstStyle/>
+          <a:p>
+            <a:pPr algn="ctr"/>
+            <a:r>
+              <a:rPr lang="en-US" dirty="0" smtClean="0"/>
+              <a:t>6.5 – 9 </a:t>
+            </a:r>
+            <a:r>
+              <a:rPr lang="en-US" dirty="0" err="1" smtClean="0"/>
+              <a:t>hr</a:t>
+            </a:r>
+            <a:endParaRPr lang="en-US" dirty="0"/>
+          </a:p>
+        </p:txBody>
+      </p:sp>
+    </p:spTree>
+    <p:extLst>
+      <p:ext uri="{BB962C8B-B14F-4D97-AF65-F5344CB8AC3E}">
+        <p14:creationId xmlns:p14="http://schemas.microsoft.com/office/powerpoint/2010/main" val="1147650654"/>
+      </p:ext>
+    </p:extLst>
+  </p:cSld>
+  <p:clrMapOvr>
+    <a:masterClrMapping/>
+  </p:clrMapOvr>
+</p:sld>
+</file>
+
+<file path=ppt/slides/slide6.xml><?xml version="1.0" encoding="utf-8"?>
+<p:sld xmlns:a="http://schemas.openxmlformats.org/drawingml/2006/main" xmlns:r="http://schemas.openxmlformats.org/officeDocument/2006/relationships" xmlns:p="http://schemas.openxmlformats.org/presentationml/2006/main">
+  <p:cSld>
+    <p:spTree>
+      <p:nvGrpSpPr>
+        <p:cNvPr id="1" name=""/>
+        <p:cNvGrpSpPr/>
+        <p:nvPr/>
+      </p:nvGrpSpPr>
+      <p:grpSpPr>
+        <a:xfrm>
+          <a:off x="0" y="0"/>
+          <a:ext cx="0" cy="0"/>
+          <a:chOff x="0" y="0"/>
+          <a:chExt cx="0" cy="0"/>
+        </a:xfrm>
+      </p:grpSpPr>
+      <p:pic>
+        <p:nvPicPr>
+          <p:cNvPr id="2" name="Picture 1"/>
+          <p:cNvPicPr>
+            <a:picLocks noChangeAspect="1"/>
+          </p:cNvPicPr>
+          <p:nvPr/>
+        </p:nvPicPr>
+        <p:blipFill rotWithShape="1">
+          <a:blip r:embed="rId2">
+            <a:extLst>
+              <a:ext uri="{28A0092B-C50C-407E-A947-70E740481C1C}">
+                <a14:useLocalDpi xmlns:a14="http://schemas.microsoft.com/office/drawing/2010/main" val="0"/>
+              </a:ext>
+            </a:extLst>
+          </a:blip>
+          <a:srcRect t="26603" b="6787"/>
+          <a:stretch/>
+        </p:blipFill>
+        <p:spPr>
+          <a:xfrm>
+            <a:off x="1010092" y="3221665"/>
+            <a:ext cx="5209953" cy="4491060"/>
+          </a:xfrm>
+          <a:prstGeom prst="rect">
+            <a:avLst/>
+          </a:prstGeom>
+        </p:spPr>
+      </p:pic>
+      <p:pic>
+        <p:nvPicPr>
+          <p:cNvPr id="3" name="Picture 2"/>
+          <p:cNvPicPr>
+            <a:picLocks noChangeAspect="1"/>
+          </p:cNvPicPr>
+          <p:nvPr/>
+        </p:nvPicPr>
+        <p:blipFill rotWithShape="1">
+          <a:blip r:embed="rId3">
+            <a:extLst>
+              <a:ext uri="{28A0092B-C50C-407E-A947-70E740481C1C}">
+                <a14:useLocalDpi xmlns:a14="http://schemas.microsoft.com/office/drawing/2010/main" val="0"/>
+              </a:ext>
+            </a:extLst>
+          </a:blip>
+          <a:srcRect l="4961" r="72868" b="75986"/>
+          <a:stretch/>
+        </p:blipFill>
+        <p:spPr>
+          <a:xfrm>
+            <a:off x="1010092" y="2074531"/>
+            <a:ext cx="1520456" cy="774995"/>
+          </a:xfrm>
+          <a:prstGeom prst="rect">
+            <a:avLst/>
+          </a:prstGeom>
+        </p:spPr>
+      </p:pic>
+      <p:sp>
+        <p:nvSpPr>
+          <p:cNvPr id="4" name="TextBox 3"/>
+          <p:cNvSpPr txBox="1"/>
+          <p:nvPr/>
+        </p:nvSpPr>
+        <p:spPr>
+          <a:xfrm>
+            <a:off x="1351102" y="1802810"/>
+            <a:ext cx="838435" cy="369332"/>
+          </a:xfrm>
+          <a:prstGeom prst="rect">
+            <a:avLst/>
+          </a:prstGeom>
+          <a:noFill/>
+        </p:spPr>
+        <p:txBody>
+          <a:bodyPr wrap="none" rtlCol="0">
+            <a:spAutoFit/>
+          </a:bodyPr>
+          <a:lstStyle/>
+          <a:p>
+            <a:r>
+              <a:rPr lang="en-US" i="1" dirty="0"/>
+              <a:t>z</a:t>
+            </a:r>
+            <a:r>
+              <a:rPr lang="en-US" i="1" dirty="0" smtClean="0"/>
+              <a:t>-score</a:t>
+            </a:r>
+            <a:endParaRPr lang="en-US" i="1" dirty="0"/>
+          </a:p>
+        </p:txBody>
+      </p:sp>
+      <p:sp>
+        <p:nvSpPr>
+          <p:cNvPr id="5" name="TextBox 4"/>
+          <p:cNvSpPr txBox="1"/>
+          <p:nvPr/>
+        </p:nvSpPr>
+        <p:spPr>
+          <a:xfrm rot="18900000">
+            <a:off x="2284139" y="7930975"/>
+            <a:ext cx="870751" cy="307777"/>
+          </a:xfrm>
+          <a:prstGeom prst="rect">
+            <a:avLst/>
+          </a:prstGeom>
+          <a:noFill/>
+        </p:spPr>
+        <p:txBody>
+          <a:bodyPr wrap="none" rtlCol="0">
+            <a:spAutoFit/>
+          </a:bodyPr>
+          <a:lstStyle/>
+          <a:p>
+            <a:r>
+              <a:rPr lang="en-US" sz="1400" dirty="0" smtClean="0"/>
+              <a:t>1.5 – 4 </a:t>
+            </a:r>
+            <a:r>
+              <a:rPr lang="en-US" sz="1400" dirty="0" err="1" smtClean="0"/>
+              <a:t>hr</a:t>
+            </a:r>
+            <a:endParaRPr lang="en-US" sz="1400" dirty="0"/>
+          </a:p>
+        </p:txBody>
+      </p:sp>
+      <p:sp>
+        <p:nvSpPr>
+          <p:cNvPr id="6" name="TextBox 5"/>
+          <p:cNvSpPr txBox="1"/>
+          <p:nvPr/>
+        </p:nvSpPr>
+        <p:spPr>
+          <a:xfrm rot="18900000">
+            <a:off x="3350236" y="7949141"/>
+            <a:ext cx="870751" cy="307777"/>
+          </a:xfrm>
+          <a:prstGeom prst="rect">
+            <a:avLst/>
+          </a:prstGeom>
+          <a:noFill/>
+        </p:spPr>
+        <p:txBody>
+          <a:bodyPr wrap="none" rtlCol="0">
+            <a:spAutoFit/>
+          </a:bodyPr>
+          <a:lstStyle/>
+          <a:p>
+            <a:r>
+              <a:rPr lang="en-US" sz="1400" dirty="0" smtClean="0"/>
+              <a:t>4 – 6.5 </a:t>
+            </a:r>
+            <a:r>
+              <a:rPr lang="en-US" sz="1400" dirty="0" err="1" smtClean="0"/>
+              <a:t>hr</a:t>
+            </a:r>
+            <a:endParaRPr lang="en-US" sz="1400" dirty="0"/>
+          </a:p>
+        </p:txBody>
+      </p:sp>
+      <p:sp>
+        <p:nvSpPr>
+          <p:cNvPr id="7" name="TextBox 6"/>
+          <p:cNvSpPr txBox="1"/>
+          <p:nvPr/>
+        </p:nvSpPr>
+        <p:spPr>
+          <a:xfrm rot="18900000">
+            <a:off x="4493881" y="7949140"/>
+            <a:ext cx="835485" cy="307777"/>
+          </a:xfrm>
+          <a:prstGeom prst="rect">
+            <a:avLst/>
+          </a:prstGeom>
+          <a:noFill/>
+        </p:spPr>
+        <p:txBody>
+          <a:bodyPr wrap="none" rtlCol="0">
+            <a:spAutoFit/>
+          </a:bodyPr>
+          <a:lstStyle/>
+          <a:p>
+            <a:r>
+              <a:rPr lang="en-US" sz="1400" smtClean="0"/>
+              <a:t>6.5 - 9 </a:t>
+            </a:r>
+            <a:r>
+              <a:rPr lang="en-US" sz="1400" dirty="0" err="1" smtClean="0"/>
+              <a:t>hr</a:t>
+            </a:r>
+            <a:endParaRPr lang="en-US" sz="1400" dirty="0"/>
+          </a:p>
+        </p:txBody>
+      </p:sp>
+    </p:spTree>
+    <p:extLst>
+      <p:ext uri="{BB962C8B-B14F-4D97-AF65-F5344CB8AC3E}">
+        <p14:creationId xmlns:p14="http://schemas.microsoft.com/office/powerpoint/2010/main" val="42647624"/>
+      </p:ext>
+    </p:extLst>
+  </p:cSld>
+  <p:clrMapOvr>
+    <a:masterClrMapping/>
+  </p:clrMapOvr>
+</p:sld>
+</file>
+
+<file path=ppt/slides/slide7.xml><?xml version="1.0" encoding="utf-8"?>
+<p:sld xmlns:a="http://schemas.openxmlformats.org/drawingml/2006/main" xmlns:r="http://schemas.openxmlformats.org/officeDocument/2006/relationships" xmlns:p="http://schemas.openxmlformats.org/presentationml/2006/main">
+  <p:cSld>
+    <p:spTree>
+      <p:nvGrpSpPr>
+        <p:cNvPr id="1" name=""/>
+        <p:cNvGrpSpPr/>
+        <p:nvPr/>
+      </p:nvGrpSpPr>
+      <p:grpSpPr>
+        <a:xfrm>
+          <a:off x="0" y="0"/>
+          <a:ext cx="0" cy="0"/>
+          <a:chOff x="0" y="0"/>
+          <a:chExt cx="0" cy="0"/>
+        </a:xfrm>
+      </p:grpSpPr>
+      <p:pic>
+        <p:nvPicPr>
+          <p:cNvPr id="2" name="Picture 1"/>
+          <p:cNvPicPr>
+            <a:picLocks noChangeAspect="1"/>
+          </p:cNvPicPr>
+          <p:nvPr/>
+        </p:nvPicPr>
+        <p:blipFill>
+          <a:blip r:embed="rId2">
+            <a:extLst>
+              <a:ext uri="{28A0092B-C50C-407E-A947-70E740481C1C}">
+                <a14:useLocalDpi xmlns:a14="http://schemas.microsoft.com/office/drawing/2010/main" val="0"/>
+              </a:ext>
+            </a:extLst>
+          </a:blip>
+          <a:stretch>
+            <a:fillRect/>
+          </a:stretch>
+        </p:blipFill>
+        <p:spPr>
+          <a:xfrm>
             <a:off x="595423" y="268941"/>
             <a:ext cx="6858000" cy="8875059"/>
           </a:xfrm>
@@ -4241,7 +4606,7 @@
 </p:sld>
 </file>
 
-<file path=ppt/slides/slide5.xml><?xml version="1.0" encoding="utf-8"?>
+<file path=ppt/slides/slide8.xml><?xml version="1.0" encoding="utf-8"?>
 <p:sld xmlns:a="http://schemas.openxmlformats.org/drawingml/2006/main" xmlns:r="http://schemas.openxmlformats.org/officeDocument/2006/relationships" xmlns:p="http://schemas.openxmlformats.org/presentationml/2006/main">
   <p:cSld>
     <p:spTree>

</xml_diff>